<commit_message>
Update PPT 5 & 6
</commit_message>
<xml_diff>
--- a/PPT/Design Pattern 5 - Factory Pattern.pptx
+++ b/PPT/Design Pattern 5 - Factory Pattern.pptx
@@ -269,7 +269,7 @@
           <a:p>
             <a:fld id="{6AD6EE87-EBD5-4F12-A48A-63ACA297AC8F}" type="datetimeFigureOut">
               <a:rPr lang="en-US" dirty="0"/>
-              <a:t>2/20/2017</a:t>
+              <a:t>9/5/2017</a:t>
             </a:fld>
             <a:endParaRPr lang="en-US" dirty="0"/>
           </a:p>
@@ -517,7 +517,7 @@
           <a:p>
             <a:fld id="{4CD73815-2707-4475-8F1A-B873CB631BB4}" type="datetimeFigureOut">
               <a:rPr lang="en-US" dirty="0"/>
-              <a:t>2/20/2017</a:t>
+              <a:t>9/5/2017</a:t>
             </a:fld>
             <a:endParaRPr lang="en-US" dirty="0"/>
           </a:p>
@@ -692,7 +692,7 @@
           <a:p>
             <a:fld id="{2A4AFB99-0EAB-4182-AFF8-E214C82A68F6}" type="datetimeFigureOut">
               <a:rPr lang="en-US" dirty="0"/>
-              <a:t>2/20/2017</a:t>
+              <a:t>9/5/2017</a:t>
             </a:fld>
             <a:endParaRPr lang="en-US" dirty="0"/>
           </a:p>
@@ -892,7 +892,7 @@
           <a:p>
             <a:fld id="{A5D3794B-289A-4A80-97D7-111025398D45}" type="datetimeFigureOut">
               <a:rPr lang="en-US" dirty="0"/>
-              <a:t>2/20/2017</a:t>
+              <a:t>9/5/2017</a:t>
             </a:fld>
             <a:endParaRPr lang="en-US" dirty="0"/>
           </a:p>
@@ -1144,7 +1144,7 @@
           <a:p>
             <a:fld id="{5A61015F-7CC6-4D0A-9D87-873EA4C304CC}" type="datetimeFigureOut">
               <a:rPr lang="en-US" dirty="0"/>
-              <a:t>2/20/2017</a:t>
+              <a:t>9/5/2017</a:t>
             </a:fld>
             <a:endParaRPr lang="en-US" dirty="0"/>
           </a:p>
@@ -1461,7 +1461,7 @@
           <a:p>
             <a:fld id="{93C6A301-0538-44EC-B09D-202E1042A48B}" type="datetimeFigureOut">
               <a:rPr lang="en-US" dirty="0"/>
-              <a:t>2/20/2017</a:t>
+              <a:t>9/5/2017</a:t>
             </a:fld>
             <a:endParaRPr lang="en-US" dirty="0"/>
           </a:p>
@@ -1854,7 +1854,7 @@
           <a:p>
             <a:fld id="{D789574A-8875-45EF-8EA2-3CAA0F7ABC4C}" type="datetimeFigureOut">
               <a:rPr lang="en-US" dirty="0"/>
-              <a:t>2/20/2017</a:t>
+              <a:t>9/5/2017</a:t>
             </a:fld>
             <a:endParaRPr lang="en-US" dirty="0"/>
           </a:p>
@@ -1967,7 +1967,7 @@
           <a:p>
             <a:fld id="{67EF4D4C-5367-4C26-9E2B-D8088D7FCA81}" type="datetimeFigureOut">
               <a:rPr lang="en-US" dirty="0"/>
-              <a:t>2/20/2017</a:t>
+              <a:t>9/5/2017</a:t>
             </a:fld>
             <a:endParaRPr lang="en-US" dirty="0"/>
           </a:p>
@@ -2057,7 +2057,7 @@
           <a:p>
             <a:fld id="{56E91E96-98B0-4413-9547-46F3504108EF}" type="datetimeFigureOut">
               <a:rPr lang="en-US" dirty="0"/>
-              <a:t>2/20/2017</a:t>
+              <a:t>9/5/2017</a:t>
             </a:fld>
             <a:endParaRPr lang="en-US" dirty="0"/>
           </a:p>
@@ -2342,7 +2342,7 @@
           <a:p>
             <a:fld id="{05C68B11-C5A8-448C-8CE9-B1A273C79CFC}" type="datetimeFigureOut">
               <a:rPr lang="en-US" dirty="0"/>
-              <a:t>2/20/2017</a:t>
+              <a:t>9/5/2017</a:t>
             </a:fld>
             <a:endParaRPr lang="en-US" dirty="0"/>
           </a:p>
@@ -2617,7 +2617,7 @@
           <a:p>
             <a:fld id="{C7616CA0-919D-4A49-9C8A-62FDFB3A5183}" type="datetimeFigureOut">
               <a:rPr lang="en-US" dirty="0"/>
-              <a:t>2/20/2017</a:t>
+              <a:t>9/5/2017</a:t>
             </a:fld>
             <a:endParaRPr lang="en-US" dirty="0"/>
           </a:p>
@@ -2863,7 +2863,7 @@
             <a:fld id="{90298CD5-6C1E-4009-B41F-6DF62E31D3BE}" type="datetimeFigureOut">
               <a:rPr lang="en-US" dirty="0"/>
               <a:pPr/>
-              <a:t>2/20/2017</a:t>
+              <a:t>9/5/2017</a:t>
             </a:fld>
             <a:endParaRPr lang="en-US" dirty="0"/>
           </a:p>
@@ -3523,11 +3523,7 @@
             </a:pPr>
             <a:r>
               <a:rPr lang="id-ID" sz="2800" dirty="0" smtClean="0"/>
-              <a:t>Kualitas barang dikontrol </a:t>
-            </a:r>
-            <a:r>
-              <a:rPr lang="id-ID" sz="2800" dirty="0" smtClean="0"/>
-              <a:t>pabrik</a:t>
+              <a:t>Kualitas barang dikontrol pabrik</a:t>
             </a:r>
           </a:p>
           <a:p>
@@ -3559,7 +3555,6 @@
               <a:rPr lang="id-ID" sz="2400" dirty="0" smtClean="0"/>
               <a:t>Modifikasi prosedur pabrik asal</a:t>
             </a:r>
-            <a:endParaRPr lang="id-ID" sz="2400" dirty="0" smtClean="0"/>
           </a:p>
         </p:txBody>
       </p:sp>
@@ -4198,11 +4193,7 @@
             <a:pPr algn="ctr"/>
             <a:r>
               <a:rPr lang="id-ID" sz="3200" dirty="0" smtClean="0"/>
-              <a:t>Factory </a:t>
-            </a:r>
-            <a:r>
-              <a:rPr lang="id-ID" sz="3200" dirty="0" smtClean="0"/>
-              <a:t>pattern/factory method mendefinisikan sebuah interface untuk membuat sebuah objek, tetapi membiarkan </a:t>
+              <a:t>Factory pattern/factory method mendefinisikan sebuah interface untuk membuat sebuah objek, tetapi membiarkan </a:t>
             </a:r>
             <a:r>
               <a:rPr lang="id-ID" sz="3200" dirty="0" smtClean="0">
@@ -4239,7 +4230,6 @@
               <a:rPr lang="id-ID" sz="3200" dirty="0" smtClean="0"/>
               <a:t>“</a:t>
             </a:r>
-            <a:endParaRPr lang="id-ID" sz="3200" dirty="0" smtClean="0"/>
           </a:p>
         </p:txBody>
       </p:sp>

</xml_diff>